<commit_message>
hid a Session 10 slide
</commit_message>
<xml_diff>
--- a/Session10/Session10_Slides.pptx
+++ b/Session10/Session10_Slides.pptx
@@ -10796,7 +10796,7 @@
           </a:ln>
           <a:extLst>
             <a:ext uri="{C572A759-6A51-4108-AA02-DFA0A04FC94B}">
-              <ma14:wrappingTextBoxFlag xmlns="" xmlns:ma14="http://schemas.microsoft.com/office/mac/drawingml/2011/main" val="1"/>
+              <ma14:wrappingTextBoxFlag xmlns:ma14="http://schemas.microsoft.com/office/mac/drawingml/2011/main" xmlns="" val="1"/>
             </a:ext>
           </a:extLst>
         </p:spPr>
@@ -10835,7 +10835,7 @@
           </a:ln>
           <a:extLst>
             <a:ext uri="{C572A759-6A51-4108-AA02-DFA0A04FC94B}">
-              <ma14:wrappingTextBoxFlag xmlns="" xmlns:ma14="http://schemas.microsoft.com/office/mac/drawingml/2011/main" val="1"/>
+              <ma14:wrappingTextBoxFlag xmlns:ma14="http://schemas.microsoft.com/office/mac/drawingml/2011/main" xmlns="" val="1"/>
             </a:ext>
           </a:extLst>
         </p:spPr>
@@ -11906,7 +11906,7 @@
           </a:ln>
           <a:extLst>
             <a:ext uri="{C572A759-6A51-4108-AA02-DFA0A04FC94B}">
-              <ma14:wrappingTextBoxFlag xmlns="" xmlns:ma14="http://schemas.microsoft.com/office/mac/drawingml/2011/main" val="1"/>
+              <ma14:wrappingTextBoxFlag xmlns:ma14="http://schemas.microsoft.com/office/mac/drawingml/2011/main" xmlns="" val="1"/>
             </a:ext>
           </a:extLst>
         </p:spPr>
@@ -11945,7 +11945,7 @@
           </a:ln>
           <a:extLst>
             <a:ext uri="{C572A759-6A51-4108-AA02-DFA0A04FC94B}">
-              <ma14:wrappingTextBoxFlag xmlns="" xmlns:ma14="http://schemas.microsoft.com/office/mac/drawingml/2011/main" val="1"/>
+              <ma14:wrappingTextBoxFlag xmlns:ma14="http://schemas.microsoft.com/office/mac/drawingml/2011/main" xmlns="" val="1"/>
             </a:ext>
           </a:extLst>
         </p:spPr>
@@ -13094,7 +13094,7 @@
           </a:ln>
           <a:extLst>
             <a:ext uri="{C572A759-6A51-4108-AA02-DFA0A04FC94B}">
-              <ma14:wrappingTextBoxFlag xmlns="" xmlns:ma14="http://schemas.microsoft.com/office/mac/drawingml/2011/main" val="1"/>
+              <ma14:wrappingTextBoxFlag xmlns:ma14="http://schemas.microsoft.com/office/mac/drawingml/2011/main" xmlns="" val="1"/>
             </a:ext>
           </a:extLst>
         </p:spPr>
@@ -13245,7 +13245,7 @@
           </a:ln>
           <a:extLst>
             <a:ext uri="{C572A759-6A51-4108-AA02-DFA0A04FC94B}">
-              <ma14:wrappingTextBoxFlag xmlns="" xmlns:ma14="http://schemas.microsoft.com/office/mac/drawingml/2011/main" val="1"/>
+              <ma14:wrappingTextBoxFlag xmlns:ma14="http://schemas.microsoft.com/office/mac/drawingml/2011/main" xmlns="" val="1"/>
             </a:ext>
           </a:extLst>
         </p:spPr>
@@ -13334,7 +13334,7 @@
           </a:ln>
           <a:extLst>
             <a:ext uri="{C572A759-6A51-4108-AA02-DFA0A04FC94B}">
-              <ma14:wrappingTextBoxFlag xmlns="" xmlns:ma14="http://schemas.microsoft.com/office/mac/drawingml/2011/main" val="1"/>
+              <ma14:wrappingTextBoxFlag xmlns:ma14="http://schemas.microsoft.com/office/mac/drawingml/2011/main" xmlns="" val="1"/>
             </a:ext>
           </a:extLst>
         </p:spPr>
@@ -13401,7 +13401,7 @@
           </a:ln>
           <a:extLst>
             <a:ext uri="{C572A759-6A51-4108-AA02-DFA0A04FC94B}">
-              <ma14:wrappingTextBoxFlag xmlns="" xmlns:ma14="http://schemas.microsoft.com/office/mac/drawingml/2011/main" val="1"/>
+              <ma14:wrappingTextBoxFlag xmlns:ma14="http://schemas.microsoft.com/office/mac/drawingml/2011/main" xmlns="" val="1"/>
             </a:ext>
           </a:extLst>
         </p:spPr>
@@ -13693,7 +13693,7 @@
           </a:ln>
           <a:extLst>
             <a:ext uri="{C572A759-6A51-4108-AA02-DFA0A04FC94B}">
-              <ma14:wrappingTextBoxFlag xmlns="" xmlns:ma14="http://schemas.microsoft.com/office/mac/drawingml/2011/main" val="1"/>
+              <ma14:wrappingTextBoxFlag xmlns:ma14="http://schemas.microsoft.com/office/mac/drawingml/2011/main" xmlns="" val="1"/>
             </a:ext>
           </a:extLst>
         </p:spPr>
@@ -13801,7 +13801,7 @@
           </a:ln>
           <a:extLst>
             <a:ext uri="{C572A759-6A51-4108-AA02-DFA0A04FC94B}">
-              <ma14:wrappingTextBoxFlag xmlns="" xmlns:ma14="http://schemas.microsoft.com/office/mac/drawingml/2011/main" val="1"/>
+              <ma14:wrappingTextBoxFlag xmlns:ma14="http://schemas.microsoft.com/office/mac/drawingml/2011/main" xmlns="" val="1"/>
             </a:ext>
           </a:extLst>
         </p:spPr>
@@ -13845,7 +13845,7 @@
           </a:ln>
           <a:extLst>
             <a:ext uri="{C572A759-6A51-4108-AA02-DFA0A04FC94B}">
-              <ma14:wrappingTextBoxFlag xmlns="" xmlns:ma14="http://schemas.microsoft.com/office/mac/drawingml/2011/main" val="1"/>
+              <ma14:wrappingTextBoxFlag xmlns:ma14="http://schemas.microsoft.com/office/mac/drawingml/2011/main" xmlns="" val="1"/>
             </a:ext>
           </a:extLst>
         </p:spPr>
@@ -14138,7 +14138,7 @@
 </file>
 
 <file path=ppt/slides/slide18.xml><?xml version="1.0" encoding="utf-8"?>
-<p:sld xmlns:a="http://schemas.openxmlformats.org/drawingml/2006/main" xmlns:r="http://schemas.openxmlformats.org/officeDocument/2006/relationships" xmlns:p="http://schemas.openxmlformats.org/presentationml/2006/main">
+<p:sld xmlns:a="http://schemas.openxmlformats.org/drawingml/2006/main" xmlns:r="http://schemas.openxmlformats.org/officeDocument/2006/relationships" xmlns:p="http://schemas.openxmlformats.org/presentationml/2006/main" show="0">
   <p:cSld>
     <p:spTree>
       <p:nvGrpSpPr>
@@ -14209,7 +14209,7 @@
           </a:ln>
           <a:extLst>
             <a:ext uri="{C572A759-6A51-4108-AA02-DFA0A04FC94B}">
-              <ma14:wrappingTextBoxFlag xmlns="" xmlns:ma14="http://schemas.microsoft.com/office/mac/drawingml/2011/main" val="1"/>
+              <ma14:wrappingTextBoxFlag xmlns:ma14="http://schemas.microsoft.com/office/mac/drawingml/2011/main" xmlns="" val="1"/>
             </a:ext>
           </a:extLst>
         </p:spPr>
@@ -14538,8 +14538,8 @@
           </a:p>
         </p:txBody>
       </p:sp>
-      <mc:AlternateContent xmlns:mc="http://schemas.openxmlformats.org/markup-compatibility/2006">
-        <mc:Choice xmlns:a14="http://schemas.microsoft.com/office/drawing/2010/main" Requires="a14">
+      <mc:AlternateContent xmlns:mc="http://schemas.openxmlformats.org/markup-compatibility/2006" xmlns:a14="http://schemas.microsoft.com/office/drawing/2010/main">
+        <mc:Choice Requires="a14">
           <p:sp>
             <p:nvSpPr>
               <p:cNvPr id="3" name="Text Placeholder 2">
@@ -14894,7 +14894,7 @@
             </p:txBody>
           </p:sp>
         </mc:Choice>
-        <mc:Fallback>
+        <mc:Fallback xmlns="">
           <p:sp>
             <p:nvSpPr>
               <p:cNvPr id="3" name="Text Placeholder 2">
@@ -15390,8 +15390,8 @@
           </a:p>
         </p:txBody>
       </p:sp>
-      <mc:AlternateContent xmlns:mc="http://schemas.openxmlformats.org/markup-compatibility/2006">
-        <mc:Choice xmlns:a14="http://schemas.microsoft.com/office/drawing/2010/main" Requires="a14">
+      <mc:AlternateContent xmlns:mc="http://schemas.openxmlformats.org/markup-compatibility/2006" xmlns:a14="http://schemas.microsoft.com/office/drawing/2010/main">
+        <mc:Choice Requires="a14">
           <p:sp>
             <p:nvSpPr>
               <p:cNvPr id="2" name="Text Placeholder 1">
@@ -15978,7 +15978,7 @@
             </p:txBody>
           </p:sp>
         </mc:Choice>
-        <mc:Fallback>
+        <mc:Fallback xmlns="">
           <p:sp>
             <p:nvSpPr>
               <p:cNvPr id="2" name="Text Placeholder 1">
@@ -16934,7 +16934,7 @@
           </a:ln>
           <a:extLst>
             <a:ext uri="{C572A759-6A51-4108-AA02-DFA0A04FC94B}">
-              <ma14:wrappingTextBoxFlag xmlns="" xmlns:ma14="http://schemas.microsoft.com/office/mac/drawingml/2011/main" val="1"/>
+              <ma14:wrappingTextBoxFlag xmlns:ma14="http://schemas.microsoft.com/office/mac/drawingml/2011/main" xmlns="" val="1"/>
             </a:ext>
           </a:extLst>
         </p:spPr>
@@ -19703,7 +19703,7 @@
           </a:ln>
           <a:extLst>
             <a:ext uri="{C572A759-6A51-4108-AA02-DFA0A04FC94B}">
-              <ma14:wrappingTextBoxFlag xmlns="" xmlns:ma14="http://schemas.microsoft.com/office/mac/drawingml/2011/main" val="1"/>
+              <ma14:wrappingTextBoxFlag xmlns:ma14="http://schemas.microsoft.com/office/mac/drawingml/2011/main" xmlns="" val="1"/>
             </a:ext>
           </a:extLst>
         </p:spPr>
@@ -19765,7 +19765,7 @@
           </a:ln>
           <a:extLst>
             <a:ext uri="{C572A759-6A51-4108-AA02-DFA0A04FC94B}">
-              <ma14:wrappingTextBoxFlag xmlns="" xmlns:ma14="http://schemas.microsoft.com/office/mac/drawingml/2011/main" val="1"/>
+              <ma14:wrappingTextBoxFlag xmlns:ma14="http://schemas.microsoft.com/office/mac/drawingml/2011/main" xmlns="" val="1"/>
             </a:ext>
           </a:extLst>
         </p:spPr>
@@ -19832,7 +19832,7 @@
           </a:ln>
           <a:extLst>
             <a:ext uri="{C572A759-6A51-4108-AA02-DFA0A04FC94B}">
-              <ma14:wrappingTextBoxFlag xmlns="" xmlns:ma14="http://schemas.microsoft.com/office/mac/drawingml/2011/main" val="1"/>
+              <ma14:wrappingTextBoxFlag xmlns:ma14="http://schemas.microsoft.com/office/mac/drawingml/2011/main" xmlns="" val="1"/>
             </a:ext>
           </a:extLst>
         </p:spPr>
@@ -19899,7 +19899,7 @@
           </a:ln>
           <a:extLst>
             <a:ext uri="{C572A759-6A51-4108-AA02-DFA0A04FC94B}">
-              <ma14:wrappingTextBoxFlag xmlns="" xmlns:ma14="http://schemas.microsoft.com/office/mac/drawingml/2011/main" val="1"/>
+              <ma14:wrappingTextBoxFlag xmlns:ma14="http://schemas.microsoft.com/office/mac/drawingml/2011/main" xmlns="" val="1"/>
             </a:ext>
           </a:extLst>
         </p:spPr>
@@ -20028,7 +20028,7 @@
           </a:ln>
           <a:extLst>
             <a:ext uri="{C572A759-6A51-4108-AA02-DFA0A04FC94B}">
-              <ma14:wrappingTextBoxFlag xmlns="" xmlns:ma14="http://schemas.microsoft.com/office/mac/drawingml/2011/main" val="1"/>
+              <ma14:wrappingTextBoxFlag xmlns:ma14="http://schemas.microsoft.com/office/mac/drawingml/2011/main" xmlns="" val="1"/>
             </a:ext>
           </a:extLst>
         </p:spPr>
@@ -20159,7 +20159,7 @@
           </a:ln>
           <a:extLst>
             <a:ext uri="{C572A759-6A51-4108-AA02-DFA0A04FC94B}">
-              <ma14:wrappingTextBoxFlag xmlns="" xmlns:ma14="http://schemas.microsoft.com/office/mac/drawingml/2011/main" val="1"/>
+              <ma14:wrappingTextBoxFlag xmlns:ma14="http://schemas.microsoft.com/office/mac/drawingml/2011/main" xmlns="" val="1"/>
             </a:ext>
           </a:extLst>
         </p:spPr>
@@ -20229,7 +20229,7 @@
           </a:ln>
           <a:extLst>
             <a:ext uri="{C572A759-6A51-4108-AA02-DFA0A04FC94B}">
-              <ma14:wrappingTextBoxFlag xmlns="" xmlns:ma14="http://schemas.microsoft.com/office/mac/drawingml/2011/main" val="1"/>
+              <ma14:wrappingTextBoxFlag xmlns:ma14="http://schemas.microsoft.com/office/mac/drawingml/2011/main" xmlns="" val="1"/>
             </a:ext>
           </a:extLst>
         </p:spPr>
@@ -20296,7 +20296,7 @@
           </a:ln>
           <a:extLst>
             <a:ext uri="{C572A759-6A51-4108-AA02-DFA0A04FC94B}">
-              <ma14:wrappingTextBoxFlag xmlns="" xmlns:ma14="http://schemas.microsoft.com/office/mac/drawingml/2011/main" val="1"/>
+              <ma14:wrappingTextBoxFlag xmlns:ma14="http://schemas.microsoft.com/office/mac/drawingml/2011/main" xmlns="" val="1"/>
             </a:ext>
           </a:extLst>
         </p:spPr>
@@ -20363,7 +20363,7 @@
           </a:ln>
           <a:extLst>
             <a:ext uri="{C572A759-6A51-4108-AA02-DFA0A04FC94B}">
-              <ma14:wrappingTextBoxFlag xmlns="" xmlns:ma14="http://schemas.microsoft.com/office/mac/drawingml/2011/main" val="1"/>
+              <ma14:wrappingTextBoxFlag xmlns:ma14="http://schemas.microsoft.com/office/mac/drawingml/2011/main" xmlns="" val="1"/>
             </a:ext>
           </a:extLst>
         </p:spPr>
@@ -20492,7 +20492,7 @@
           </a:ln>
           <a:extLst>
             <a:ext uri="{C572A759-6A51-4108-AA02-DFA0A04FC94B}">
-              <ma14:wrappingTextBoxFlag xmlns="" xmlns:ma14="http://schemas.microsoft.com/office/mac/drawingml/2011/main" val="1"/>
+              <ma14:wrappingTextBoxFlag xmlns:ma14="http://schemas.microsoft.com/office/mac/drawingml/2011/main" xmlns="" val="1"/>
             </a:ext>
           </a:extLst>
         </p:spPr>
@@ -20623,7 +20623,7 @@
           </a:ln>
           <a:extLst>
             <a:ext uri="{C572A759-6A51-4108-AA02-DFA0A04FC94B}">
-              <ma14:wrappingTextBoxFlag xmlns="" xmlns:ma14="http://schemas.microsoft.com/office/mac/drawingml/2011/main" val="1"/>
+              <ma14:wrappingTextBoxFlag xmlns:ma14="http://schemas.microsoft.com/office/mac/drawingml/2011/main" xmlns="" val="1"/>
             </a:ext>
           </a:extLst>
         </p:spPr>

</xml_diff>